<commit_message>
add code for dealing with spritesheet
</commit_message>
<xml_diff>
--- a/Documentation/Project Proposal.pptx
+++ b/Documentation/Project Proposal.pptx
@@ -106,6 +106,11 @@
       </a:defRPr>
     </a:lvl9pPr>
   </p:defaultTextStyle>
+  <p:extLst>
+    <p:ext uri="{EFAFB233-063F-42B5-8137-9DF3F51BA10A}">
+      <p15:sldGuideLst xmlns:p15="http://schemas.microsoft.com/office/powerpoint/2012/main"/>
+    </p:ext>
+  </p:extLst>
 </p:presentation>
 </file>
 
@@ -256,7 +261,7 @@
           <a:p>
             <a:fld id="{663FCB29-2676-426F-A85E-B379AF0D74C8}" type="datetimeFigureOut">
               <a:rPr lang="en-US" smtClean="0"/>
-              <a:t>11/16/2024</a:t>
+              <a:t>11/17/2024</a:t>
             </a:fld>
             <a:endParaRPr lang="en-US"/>
           </a:p>
@@ -454,7 +459,7 @@
           <a:p>
             <a:fld id="{663FCB29-2676-426F-A85E-B379AF0D74C8}" type="datetimeFigureOut">
               <a:rPr lang="en-US" smtClean="0"/>
-              <a:t>11/16/2024</a:t>
+              <a:t>11/17/2024</a:t>
             </a:fld>
             <a:endParaRPr lang="en-US"/>
           </a:p>
@@ -662,7 +667,7 @@
           <a:p>
             <a:fld id="{663FCB29-2676-426F-A85E-B379AF0D74C8}" type="datetimeFigureOut">
               <a:rPr lang="en-US" smtClean="0"/>
-              <a:t>11/16/2024</a:t>
+              <a:t>11/17/2024</a:t>
             </a:fld>
             <a:endParaRPr lang="en-US"/>
           </a:p>
@@ -860,7 +865,7 @@
           <a:p>
             <a:fld id="{663FCB29-2676-426F-A85E-B379AF0D74C8}" type="datetimeFigureOut">
               <a:rPr lang="en-US" smtClean="0"/>
-              <a:t>11/16/2024</a:t>
+              <a:t>11/17/2024</a:t>
             </a:fld>
             <a:endParaRPr lang="en-US"/>
           </a:p>
@@ -1135,7 +1140,7 @@
           <a:p>
             <a:fld id="{663FCB29-2676-426F-A85E-B379AF0D74C8}" type="datetimeFigureOut">
               <a:rPr lang="en-US" smtClean="0"/>
-              <a:t>11/16/2024</a:t>
+              <a:t>11/17/2024</a:t>
             </a:fld>
             <a:endParaRPr lang="en-US"/>
           </a:p>
@@ -1400,7 +1405,7 @@
           <a:p>
             <a:fld id="{663FCB29-2676-426F-A85E-B379AF0D74C8}" type="datetimeFigureOut">
               <a:rPr lang="en-US" smtClean="0"/>
-              <a:t>11/16/2024</a:t>
+              <a:t>11/17/2024</a:t>
             </a:fld>
             <a:endParaRPr lang="en-US"/>
           </a:p>
@@ -1812,7 +1817,7 @@
           <a:p>
             <a:fld id="{663FCB29-2676-426F-A85E-B379AF0D74C8}" type="datetimeFigureOut">
               <a:rPr lang="en-US" smtClean="0"/>
-              <a:t>11/16/2024</a:t>
+              <a:t>11/17/2024</a:t>
             </a:fld>
             <a:endParaRPr lang="en-US"/>
           </a:p>
@@ -1953,7 +1958,7 @@
           <a:p>
             <a:fld id="{663FCB29-2676-426F-A85E-B379AF0D74C8}" type="datetimeFigureOut">
               <a:rPr lang="en-US" smtClean="0"/>
-              <a:t>11/16/2024</a:t>
+              <a:t>11/17/2024</a:t>
             </a:fld>
             <a:endParaRPr lang="en-US"/>
           </a:p>
@@ -2066,7 +2071,7 @@
           <a:p>
             <a:fld id="{663FCB29-2676-426F-A85E-B379AF0D74C8}" type="datetimeFigureOut">
               <a:rPr lang="en-US" smtClean="0"/>
-              <a:t>11/16/2024</a:t>
+              <a:t>11/17/2024</a:t>
             </a:fld>
             <a:endParaRPr lang="en-US"/>
           </a:p>
@@ -2377,7 +2382,7 @@
           <a:p>
             <a:fld id="{663FCB29-2676-426F-A85E-B379AF0D74C8}" type="datetimeFigureOut">
               <a:rPr lang="en-US" smtClean="0"/>
-              <a:t>11/16/2024</a:t>
+              <a:t>11/17/2024</a:t>
             </a:fld>
             <a:endParaRPr lang="en-US"/>
           </a:p>
@@ -2665,7 +2670,7 @@
           <a:p>
             <a:fld id="{663FCB29-2676-426F-A85E-B379AF0D74C8}" type="datetimeFigureOut">
               <a:rPr lang="en-US" smtClean="0"/>
-              <a:t>11/16/2024</a:t>
+              <a:t>11/17/2024</a:t>
             </a:fld>
             <a:endParaRPr lang="en-US"/>
           </a:p>
@@ -2906,7 +2911,7 @@
           <a:p>
             <a:fld id="{663FCB29-2676-426F-A85E-B379AF0D74C8}" type="datetimeFigureOut">
               <a:rPr lang="en-US" smtClean="0"/>
-              <a:t>11/16/2024</a:t>
+              <a:t>11/17/2024</a:t>
             </a:fld>
             <a:endParaRPr lang="en-US"/>
           </a:p>
@@ -3346,7 +3351,7 @@
           <a:p>
             <a:r>
               <a:rPr lang="en-US" dirty="0"/>
-              <a:t>Data Structure Destroyer</a:t>
+              <a:t>Dungeon Destroyer</a:t>
             </a:r>
           </a:p>
         </p:txBody>
@@ -3493,16 +3498,15 @@
                 <a:ea typeface="Calibri" panose="020F0502020204030204" pitchFamily="34" charset="0"/>
                 <a:cs typeface="Times New Roman" panose="02020603050405020304" pitchFamily="18" charset="0"/>
               </a:rPr>
-              <a:t>considering making a turn-based RPG style game called “Data Structure Destroyer” (DSD for short). The main premise of the game is to traverse through the map which will be implemented using a graph, and the player has to battle monsters in turn-base combat. To learn new skills, players must unlock items on the skill tree by solving coding problems similar to </a:t>
-            </a:r>
-            <a:r>
-              <a:rPr lang="en-US" sz="1800" kern="100" dirty="0" err="1">
-                <a:effectLst/>
+              <a:t>considering making a turn-based RPG style game called “</a:t>
+            </a:r>
+            <a:r>
+              <a:rPr lang="en-US" sz="1800" kern="100" dirty="0">
                 <a:latin typeface="Calibri" panose="020F0502020204030204" pitchFamily="34" charset="0"/>
                 <a:ea typeface="Calibri" panose="020F0502020204030204" pitchFamily="34" charset="0"/>
                 <a:cs typeface="Times New Roman" panose="02020603050405020304" pitchFamily="18" charset="0"/>
               </a:rPr>
-              <a:t>Leetcode</a:t>
+              <a:t>Dungeon </a:t>
             </a:r>
             <a:r>
               <a:rPr lang="en-US" sz="1800" kern="100" dirty="0">
@@ -3511,25 +3515,7 @@
                 <a:ea typeface="Calibri" panose="020F0502020204030204" pitchFamily="34" charset="0"/>
                 <a:cs typeface="Times New Roman" panose="02020603050405020304" pitchFamily="18" charset="0"/>
               </a:rPr>
-              <a:t>, and these skills can be upgraded with loot/gold earned from fights. Certain skills will be more effective against certain monsters, and thus, players will have to focus on unlocking different parts of the skill tree to ensure they can pass levels. I was thinking of modeling the skill tree based on concepts found in </a:t>
-            </a:r>
-            <a:r>
-              <a:rPr lang="en-US" sz="1800" kern="100" dirty="0" err="1">
-                <a:effectLst/>
-                <a:latin typeface="Calibri" panose="020F0502020204030204" pitchFamily="34" charset="0"/>
-                <a:ea typeface="Calibri" panose="020F0502020204030204" pitchFamily="34" charset="0"/>
-                <a:cs typeface="Times New Roman" panose="02020603050405020304" pitchFamily="18" charset="0"/>
-              </a:rPr>
-              <a:t>Leetcode’s</a:t>
-            </a:r>
-            <a:r>
-              <a:rPr lang="en-US" sz="1800" kern="100" dirty="0">
-                <a:effectLst/>
-                <a:latin typeface="Calibri" panose="020F0502020204030204" pitchFamily="34" charset="0"/>
-                <a:ea typeface="Calibri" panose="020F0502020204030204" pitchFamily="34" charset="0"/>
-                <a:cs typeface="Times New Roman" panose="02020603050405020304" pitchFamily="18" charset="0"/>
-              </a:rPr>
-              <a:t> Blind 75, but I will limit them to easy and medium problems for this first iteration. Also, user related info will be stored using </a:t>
+              <a:t>Destroyer”. The main premise of the game is to traverse through the map which will be implemented using a graph, and the player has to battle monsters in turn-base combat. To learn new skills, players must unlock items on the skill with loot/gold earned from fights. Certain skills will be more effective against certain monsters, and thus, players will have to focus on unlocking different parts of the skill tree to ensure they can pass levels. Also, user related info will be stored using </a:t>
             </a:r>
             <a:r>
               <a:rPr lang="en-US" sz="1800" kern="100" dirty="0" err="1">
@@ -3547,7 +3533,24 @@
                 <a:ea typeface="Calibri" panose="020F0502020204030204" pitchFamily="34" charset="0"/>
                 <a:cs typeface="Times New Roman" panose="02020603050405020304" pitchFamily="18" charset="0"/>
               </a:rPr>
-              <a:t> and lists. The end goal of the game is to reach the end of the map and defeat the boss. The story is still somewhat incomplete, but these are the general mechanics I would like to implement. </a:t>
+              <a:t> and lists</a:t>
+            </a:r>
+            <a:r>
+              <a:rPr lang="en-US" sz="1800" kern="100" dirty="0">
+                <a:latin typeface="Calibri" panose="020F0502020204030204" pitchFamily="34" charset="0"/>
+                <a:ea typeface="Calibri" panose="020F0502020204030204" pitchFamily="34" charset="0"/>
+                <a:cs typeface="Times New Roman" panose="02020603050405020304" pitchFamily="18" charset="0"/>
+              </a:rPr>
+              <a:t>, and the turn based system between player and ai enemies will be implemented using a queue. </a:t>
+            </a:r>
+            <a:r>
+              <a:rPr lang="en-US" sz="1800" kern="100" dirty="0">
+                <a:effectLst/>
+                <a:latin typeface="Calibri" panose="020F0502020204030204" pitchFamily="34" charset="0"/>
+                <a:ea typeface="Calibri" panose="020F0502020204030204" pitchFamily="34" charset="0"/>
+                <a:cs typeface="Times New Roman" panose="02020603050405020304" pitchFamily="18" charset="0"/>
+              </a:rPr>
+              <a:t>The end goal of the game is to reach the end of the map and defeat the boss. The story is still somewhat incomplete, but these are the general mechanics I would like to implement. </a:t>
             </a:r>
           </a:p>
           <a:p>
@@ -3619,11 +3622,101 @@
           <a:p>
             <a:r>
               <a:rPr lang="en-US" dirty="0"/>
-              <a:t>Ideas for theme/style/world building/UI </a:t>
-            </a:r>
-          </a:p>
-        </p:txBody>
-      </p:sp>
+              <a:t>Initial game &amp; assets</a:t>
+            </a:r>
+          </a:p>
+        </p:txBody>
+      </p:sp>
+      <p:pic>
+        <p:nvPicPr>
+          <p:cNvPr id="4" name="Picture 3">
+            <a:extLst>
+              <a:ext uri="{FF2B5EF4-FFF2-40B4-BE49-F238E27FC236}">
+                <a16:creationId xmlns:a16="http://schemas.microsoft.com/office/drawing/2014/main" id="{9F220634-2A89-1D0D-544C-07B25612FA66}"/>
+              </a:ext>
+            </a:extLst>
+          </p:cNvPr>
+          <p:cNvPicPr>
+            <a:picLocks noChangeAspect="1"/>
+          </p:cNvPicPr>
+          <p:nvPr/>
+        </p:nvPicPr>
+        <p:blipFill>
+          <a:blip r:embed="rId2"/>
+          <a:stretch>
+            <a:fillRect/>
+          </a:stretch>
+        </p:blipFill>
+        <p:spPr>
+          <a:xfrm>
+            <a:off x="1119297" y="1771351"/>
+            <a:ext cx="6338396" cy="4524927"/>
+          </a:xfrm>
+          <a:prstGeom prst="rect">
+            <a:avLst/>
+          </a:prstGeom>
+        </p:spPr>
+      </p:pic>
+      <p:pic>
+        <p:nvPicPr>
+          <p:cNvPr id="6" name="Picture 5">
+            <a:extLst>
+              <a:ext uri="{FF2B5EF4-FFF2-40B4-BE49-F238E27FC236}">
+                <a16:creationId xmlns:a16="http://schemas.microsoft.com/office/drawing/2014/main" id="{C5019AC7-FC12-441A-EC81-0D7CB40A1EAF}"/>
+              </a:ext>
+            </a:extLst>
+          </p:cNvPr>
+          <p:cNvPicPr>
+            <a:picLocks noChangeAspect="1"/>
+          </p:cNvPicPr>
+          <p:nvPr/>
+        </p:nvPicPr>
+        <p:blipFill>
+          <a:blip r:embed="rId3"/>
+          <a:stretch>
+            <a:fillRect/>
+          </a:stretch>
+        </p:blipFill>
+        <p:spPr>
+          <a:xfrm>
+            <a:off x="7761233" y="1758773"/>
+            <a:ext cx="2855674" cy="2182736"/>
+          </a:xfrm>
+          <a:prstGeom prst="rect">
+            <a:avLst/>
+          </a:prstGeom>
+        </p:spPr>
+      </p:pic>
+      <p:pic>
+        <p:nvPicPr>
+          <p:cNvPr id="8" name="Picture 7">
+            <a:extLst>
+              <a:ext uri="{FF2B5EF4-FFF2-40B4-BE49-F238E27FC236}">
+                <a16:creationId xmlns:a16="http://schemas.microsoft.com/office/drawing/2014/main" id="{55D127CC-4E89-0952-99CF-51EFC7996B62}"/>
+              </a:ext>
+            </a:extLst>
+          </p:cNvPr>
+          <p:cNvPicPr>
+            <a:picLocks noChangeAspect="1"/>
+          </p:cNvPicPr>
+          <p:nvPr/>
+        </p:nvPicPr>
+        <p:blipFill>
+          <a:blip r:embed="rId4"/>
+          <a:stretch>
+            <a:fillRect/>
+          </a:stretch>
+        </p:blipFill>
+        <p:spPr>
+          <a:xfrm>
+            <a:off x="7761233" y="3900848"/>
+            <a:ext cx="2855675" cy="2410161"/>
+          </a:xfrm>
+          <a:prstGeom prst="rect">
+            <a:avLst/>
+          </a:prstGeom>
+        </p:spPr>
+      </p:pic>
     </p:spTree>
     <p:extLst>
       <p:ext uri="{BB962C8B-B14F-4D97-AF65-F5344CB8AC3E}">

</xml_diff>

<commit_message>
modify level and try to incorporate tree ds
</commit_message>
<xml_diff>
--- a/Documentation/Project Proposal.pptx
+++ b/Documentation/Project Proposal.pptx
@@ -4140,7 +4140,7 @@
           <a:p>
             <a:fld id="{663FCB29-2676-426F-A85E-B379AF0D74C8}" type="datetimeFigureOut">
               <a:rPr lang="en-US" smtClean="0"/>
-              <a:t>11/24/2024</a:t>
+              <a:t>11/25/2024</a:t>
             </a:fld>
             <a:endParaRPr lang="en-US"/>
           </a:p>
@@ -4368,7 +4368,7 @@
           <a:p>
             <a:fld id="{663FCB29-2676-426F-A85E-B379AF0D74C8}" type="datetimeFigureOut">
               <a:rPr lang="en-US" smtClean="0"/>
-              <a:t>11/24/2024</a:t>
+              <a:t>11/25/2024</a:t>
             </a:fld>
             <a:endParaRPr lang="en-US"/>
           </a:p>
@@ -4548,7 +4548,7 @@
           <a:p>
             <a:fld id="{663FCB29-2676-426F-A85E-B379AF0D74C8}" type="datetimeFigureOut">
               <a:rPr lang="en-US" smtClean="0"/>
-              <a:t>11/24/2024</a:t>
+              <a:t>11/25/2024</a:t>
             </a:fld>
             <a:endParaRPr lang="en-US"/>
           </a:p>
@@ -4718,7 +4718,7 @@
           <a:p>
             <a:fld id="{663FCB29-2676-426F-A85E-B379AF0D74C8}" type="datetimeFigureOut">
               <a:rPr lang="en-US" smtClean="0"/>
-              <a:t>11/24/2024</a:t>
+              <a:t>11/25/2024</a:t>
             </a:fld>
             <a:endParaRPr lang="en-US"/>
           </a:p>
@@ -4972,7 +4972,7 @@
           <a:p>
             <a:fld id="{663FCB29-2676-426F-A85E-B379AF0D74C8}" type="datetimeFigureOut">
               <a:rPr lang="en-US" smtClean="0"/>
-              <a:t>11/24/2024</a:t>
+              <a:t>11/25/2024</a:t>
             </a:fld>
             <a:endParaRPr lang="en-US"/>
           </a:p>
@@ -5298,7 +5298,7 @@
           <a:p>
             <a:fld id="{663FCB29-2676-426F-A85E-B379AF0D74C8}" type="datetimeFigureOut">
               <a:rPr lang="en-US" smtClean="0"/>
-              <a:t>11/24/2024</a:t>
+              <a:t>11/25/2024</a:t>
             </a:fld>
             <a:endParaRPr lang="en-US"/>
           </a:p>
@@ -5749,7 +5749,7 @@
           <a:p>
             <a:fld id="{663FCB29-2676-426F-A85E-B379AF0D74C8}" type="datetimeFigureOut">
               <a:rPr lang="en-US" smtClean="0"/>
-              <a:t>11/24/2024</a:t>
+              <a:t>11/25/2024</a:t>
             </a:fld>
             <a:endParaRPr lang="en-US"/>
           </a:p>
@@ -5867,7 +5867,7 @@
           <a:p>
             <a:fld id="{663FCB29-2676-426F-A85E-B379AF0D74C8}" type="datetimeFigureOut">
               <a:rPr lang="en-US" smtClean="0"/>
-              <a:t>11/24/2024</a:t>
+              <a:t>11/25/2024</a:t>
             </a:fld>
             <a:endParaRPr lang="en-US"/>
           </a:p>
@@ -5962,7 +5962,7 @@
           <a:p>
             <a:fld id="{663FCB29-2676-426F-A85E-B379AF0D74C8}" type="datetimeFigureOut">
               <a:rPr lang="en-US" smtClean="0"/>
-              <a:t>11/24/2024</a:t>
+              <a:t>11/25/2024</a:t>
             </a:fld>
             <a:endParaRPr lang="en-US"/>
           </a:p>
@@ -6249,7 +6249,7 @@
           <a:p>
             <a:fld id="{663FCB29-2676-426F-A85E-B379AF0D74C8}" type="datetimeFigureOut">
               <a:rPr lang="en-US" smtClean="0"/>
-              <a:t>11/24/2024</a:t>
+              <a:t>11/25/2024</a:t>
             </a:fld>
             <a:endParaRPr lang="en-US"/>
           </a:p>
@@ -6571,7 +6571,7 @@
           <a:p>
             <a:fld id="{663FCB29-2676-426F-A85E-B379AF0D74C8}" type="datetimeFigureOut">
               <a:rPr lang="en-US" smtClean="0"/>
-              <a:t>11/24/2024</a:t>
+              <a:t>11/25/2024</a:t>
             </a:fld>
             <a:endParaRPr lang="en-US"/>
           </a:p>
@@ -6825,7 +6825,7 @@
           <a:p>
             <a:fld id="{663FCB29-2676-426F-A85E-B379AF0D74C8}" type="datetimeFigureOut">
               <a:rPr lang="en-US" smtClean="0"/>
-              <a:t>11/24/2024</a:t>
+              <a:t>11/25/2024</a:t>
             </a:fld>
             <a:endParaRPr lang="en-US"/>
           </a:p>
@@ -9279,59 +9279,42 @@
           <a:chExt cx="0" cy="0"/>
         </a:xfrm>
       </p:grpSpPr>
-      <p:sp>
-        <p:nvSpPr>
-          <p:cNvPr id="2" name="Title 1">
+      <p:pic>
+        <p:nvPicPr>
+          <p:cNvPr id="7" name="Picture 6">
             <a:extLst>
               <a:ext uri="{FF2B5EF4-FFF2-40B4-BE49-F238E27FC236}">
-                <a16:creationId xmlns:a16="http://schemas.microsoft.com/office/drawing/2014/main" id="{B36CBB07-7C28-66DC-28AA-213BB52EE028}"/>
+                <a16:creationId xmlns:a16="http://schemas.microsoft.com/office/drawing/2014/main" id="{1D196096-B097-901E-B54C-9930C993EC9C}"/>
               </a:ext>
             </a:extLst>
           </p:cNvPr>
-          <p:cNvSpPr>
-            <a:spLocks noGrp="1"/>
-          </p:cNvSpPr>
-          <p:nvPr>
-            <p:ph type="title"/>
-          </p:nvPr>
-        </p:nvSpPr>
-        <p:spPr/>
-        <p:txBody>
-          <a:bodyPr/>
-          <a:lstStyle/>
-          <a:p>
-            <a:r>
-              <a:rPr lang="en-US" dirty="0"/>
-              <a:t>UML</a:t>
-            </a:r>
-          </a:p>
-        </p:txBody>
-      </p:sp>
-      <p:sp>
-        <p:nvSpPr>
-          <p:cNvPr id="3" name="Content Placeholder 2">
+          <p:cNvPicPr>
+            <a:picLocks noChangeAspect="1"/>
+          </p:cNvPicPr>
+          <p:nvPr/>
+        </p:nvPicPr>
+        <p:blipFill>
+          <a:blip r:embed="rId2">
             <a:extLst>
-              <a:ext uri="{FF2B5EF4-FFF2-40B4-BE49-F238E27FC236}">
-                <a16:creationId xmlns:a16="http://schemas.microsoft.com/office/drawing/2014/main" id="{182FB7E3-A78C-ED89-A1E3-07DC3DE894DB}"/>
+              <a:ext uri="{28A0092B-C50C-407E-A947-70E740481C1C}">
+                <a14:useLocalDpi xmlns:a14="http://schemas.microsoft.com/office/drawing/2010/main" val="0"/>
               </a:ext>
             </a:extLst>
-          </p:cNvPr>
-          <p:cNvSpPr>
-            <a:spLocks noGrp="1"/>
-          </p:cNvSpPr>
-          <p:nvPr>
-            <p:ph idx="1"/>
-          </p:nvPr>
-        </p:nvSpPr>
-        <p:spPr/>
-        <p:txBody>
-          <a:bodyPr/>
-          <a:lstStyle/>
-          <a:p>
-            <a:endParaRPr lang="en-US"/>
-          </a:p>
-        </p:txBody>
-      </p:sp>
+          </a:blip>
+          <a:stretch>
+            <a:fillRect/>
+          </a:stretch>
+        </p:blipFill>
+        <p:spPr>
+          <a:xfrm>
+            <a:off x="1121428" y="290146"/>
+            <a:ext cx="9238048" cy="6277707"/>
+          </a:xfrm>
+          <a:prstGeom prst="rect">
+            <a:avLst/>
+          </a:prstGeom>
+        </p:spPr>
+      </p:pic>
     </p:spTree>
     <p:extLst>
       <p:ext uri="{BB962C8B-B14F-4D97-AF65-F5344CB8AC3E}">

</xml_diff>